<commit_message>
fixed incorrect printing of test set instead of validation set
</commit_message>
<xml_diff>
--- a/Poster.pptx
+++ b/Poster.pptx
@@ -104,6 +104,11 @@
       </a:defRPr>
     </a:lvl9pPr>
   </p:defaultTextStyle>
+  <p:extLst>
+    <p:ext uri="{EFAFB233-063F-42B5-8137-9DF3F51BA10A}">
+      <p15:sldGuideLst xmlns:p15="http://schemas.microsoft.com/office/powerpoint/2012/main"/>
+    </p:ext>
+  </p:extLst>
 </p:presentation>
 </file>
 
@@ -2320,7 +2325,7 @@
           <a:p>
             <a:fld id="{FB6862F1-E970-4543-9C48-06AF413EA094}" type="datetimeFigureOut">
               <a:rPr lang="en-US" smtClean="0"/>
-              <a:t>12/4/2018</a:t>
+              <a:t>12/5/2018</a:t>
             </a:fld>
             <a:endParaRPr lang="en-US"/>
           </a:p>
@@ -2490,7 +2495,7 @@
           <a:p>
             <a:fld id="{FB6862F1-E970-4543-9C48-06AF413EA094}" type="datetimeFigureOut">
               <a:rPr lang="en-US" smtClean="0"/>
-              <a:t>12/4/2018</a:t>
+              <a:t>12/5/2018</a:t>
             </a:fld>
             <a:endParaRPr lang="en-US"/>
           </a:p>
@@ -2670,7 +2675,7 @@
           <a:p>
             <a:fld id="{FB6862F1-E970-4543-9C48-06AF413EA094}" type="datetimeFigureOut">
               <a:rPr lang="en-US" smtClean="0"/>
-              <a:t>12/4/2018</a:t>
+              <a:t>12/5/2018</a:t>
             </a:fld>
             <a:endParaRPr lang="en-US"/>
           </a:p>
@@ -2840,7 +2845,7 @@
           <a:p>
             <a:fld id="{FB6862F1-E970-4543-9C48-06AF413EA094}" type="datetimeFigureOut">
               <a:rPr lang="en-US" smtClean="0"/>
-              <a:t>12/4/2018</a:t>
+              <a:t>12/5/2018</a:t>
             </a:fld>
             <a:endParaRPr lang="en-US"/>
           </a:p>
@@ -3084,7 +3089,7 @@
           <a:p>
             <a:fld id="{FB6862F1-E970-4543-9C48-06AF413EA094}" type="datetimeFigureOut">
               <a:rPr lang="en-US" smtClean="0"/>
-              <a:t>12/4/2018</a:t>
+              <a:t>12/5/2018</a:t>
             </a:fld>
             <a:endParaRPr lang="en-US"/>
           </a:p>
@@ -3316,7 +3321,7 @@
           <a:p>
             <a:fld id="{FB6862F1-E970-4543-9C48-06AF413EA094}" type="datetimeFigureOut">
               <a:rPr lang="en-US" smtClean="0"/>
-              <a:t>12/4/2018</a:t>
+              <a:t>12/5/2018</a:t>
             </a:fld>
             <a:endParaRPr lang="en-US"/>
           </a:p>
@@ -3683,7 +3688,7 @@
           <a:p>
             <a:fld id="{FB6862F1-E970-4543-9C48-06AF413EA094}" type="datetimeFigureOut">
               <a:rPr lang="en-US" smtClean="0"/>
-              <a:t>12/4/2018</a:t>
+              <a:t>12/5/2018</a:t>
             </a:fld>
             <a:endParaRPr lang="en-US"/>
           </a:p>
@@ -3801,7 +3806,7 @@
           <a:p>
             <a:fld id="{FB6862F1-E970-4543-9C48-06AF413EA094}" type="datetimeFigureOut">
               <a:rPr lang="en-US" smtClean="0"/>
-              <a:t>12/4/2018</a:t>
+              <a:t>12/5/2018</a:t>
             </a:fld>
             <a:endParaRPr lang="en-US"/>
           </a:p>
@@ -3896,7 +3901,7 @@
           <a:p>
             <a:fld id="{FB6862F1-E970-4543-9C48-06AF413EA094}" type="datetimeFigureOut">
               <a:rPr lang="en-US" smtClean="0"/>
-              <a:t>12/4/2018</a:t>
+              <a:t>12/5/2018</a:t>
             </a:fld>
             <a:endParaRPr lang="en-US"/>
           </a:p>
@@ -4173,7 +4178,7 @@
           <a:p>
             <a:fld id="{FB6862F1-E970-4543-9C48-06AF413EA094}" type="datetimeFigureOut">
               <a:rPr lang="en-US" smtClean="0"/>
-              <a:t>12/4/2018</a:t>
+              <a:t>12/5/2018</a:t>
             </a:fld>
             <a:endParaRPr lang="en-US"/>
           </a:p>
@@ -4430,7 +4435,7 @@
           <a:p>
             <a:fld id="{FB6862F1-E970-4543-9C48-06AF413EA094}" type="datetimeFigureOut">
               <a:rPr lang="en-US" smtClean="0"/>
-              <a:t>12/4/2018</a:t>
+              <a:t>12/5/2018</a:t>
             </a:fld>
             <a:endParaRPr lang="en-US"/>
           </a:p>
@@ -4643,7 +4648,7 @@
           <a:p>
             <a:fld id="{FB6862F1-E970-4543-9C48-06AF413EA094}" type="datetimeFigureOut">
               <a:rPr lang="en-US" smtClean="0"/>
-              <a:t>12/4/2018</a:t>
+              <a:t>12/5/2018</a:t>
             </a:fld>
             <a:endParaRPr lang="en-US"/>
           </a:p>
@@ -5062,8 +5067,8 @@
         </p:nvSpPr>
         <p:spPr>
           <a:xfrm>
-            <a:off x="8143875" y="1165235"/>
-            <a:ext cx="16630650" cy="3416320"/>
+            <a:off x="5812971" y="748615"/>
+            <a:ext cx="21292458" cy="2308324"/>
           </a:xfrm>
           <a:prstGeom prst="rect">
             <a:avLst/>
@@ -5348,7 +5353,7 @@
         </p:nvSpPr>
         <p:spPr>
           <a:xfrm>
-            <a:off x="0" y="4731619"/>
+            <a:off x="21057556" y="2655486"/>
             <a:ext cx="11201400" cy="4154984"/>
           </a:xfrm>
           <a:prstGeom prst="rect">
@@ -5376,6 +5381,42 @@
           </a:p>
         </p:txBody>
       </p:sp>
+      <p:pic>
+        <p:nvPicPr>
+          <p:cNvPr id="3" name="Picture 2" descr="A screenshot of a cell phone&#10;&#10;Description automatically generated">
+            <a:extLst>
+              <a:ext uri="{FF2B5EF4-FFF2-40B4-BE49-F238E27FC236}">
+                <a16:creationId xmlns:a16="http://schemas.microsoft.com/office/drawing/2014/main" id="{5578F1C1-3C3C-4372-A67B-9CC5639BDA77}"/>
+              </a:ext>
+            </a:extLst>
+          </p:cNvPr>
+          <p:cNvPicPr>
+            <a:picLocks noChangeAspect="1"/>
+          </p:cNvPicPr>
+          <p:nvPr/>
+        </p:nvPicPr>
+        <p:blipFill>
+          <a:blip r:embed="rId5">
+            <a:extLst>
+              <a:ext uri="{28A0092B-C50C-407E-A947-70E740481C1C}">
+                <a14:useLocalDpi xmlns:a14="http://schemas.microsoft.com/office/drawing/2010/main" val="0"/>
+              </a:ext>
+            </a:extLst>
+          </a:blip>
+          <a:stretch>
+            <a:fillRect/>
+          </a:stretch>
+        </p:blipFill>
+        <p:spPr>
+          <a:xfrm>
+            <a:off x="170576" y="3150590"/>
+            <a:ext cx="10677525" cy="18678525"/>
+          </a:xfrm>
+          <a:prstGeom prst="rect">
+            <a:avLst/>
+          </a:prstGeom>
+        </p:spPr>
+      </p:pic>
     </p:spTree>
     <p:extLst>
       <p:ext uri="{BB962C8B-B14F-4D97-AF65-F5344CB8AC3E}">

</xml_diff>